<commit_message>
plot ohad's brain + activity
</commit_message>
<xml_diff>
--- a/docs/MNE_4D_data.pptx
+++ b/docs/MNE_4D_data.pptx
@@ -26,6 +26,7 @@
     <p:sldId id="269" r:id="rId19"/>
     <p:sldId id="270" r:id="rId20"/>
     <p:sldId id="271" r:id="rId21"/>
+    <p:sldId id="272" r:id="rId22"/>
   </p:sldIdLst>
   <p:sldSz cx="10080625" cy="7559675"/>
   <p:notesSz cx="7772400" cy="10058400"/>
@@ -201,7 +202,7 @@
           <a:bodyPr lIns="0" rIns="0" tIns="0" bIns="0" anchor="b"/>
           <a:p>
             <a:pPr algn="r"/>
-            <a:fld id="{DF9DB47B-0925-4B90-B71C-363660010F14}" type="slidenum">
+            <a:fld id="{E7119647-4831-4AC3-B70D-5C89B788E347}" type="slidenum">
               <a:rPr lang="en-GB" sz="1400">
                 <a:latin typeface="Times New Roman"/>
               </a:rPr>
@@ -236,7 +237,7 @@
       </p:grpSpPr>
       <p:sp>
         <p:nvSpPr>
-          <p:cNvPr id="170" name="CustomShape 1"/>
+          <p:cNvPr id="171" name="CustomShape 1"/>
           <p:cNvSpPr/>
           <p:nvPr/>
         </p:nvSpPr>
@@ -278,7 +279,7 @@
       </p:grpSpPr>
       <p:sp>
         <p:nvSpPr>
-          <p:cNvPr id="179" name="CustomShape 1"/>
+          <p:cNvPr id="180" name="CustomShape 1"/>
           <p:cNvSpPr/>
           <p:nvPr/>
         </p:nvSpPr>
@@ -320,7 +321,7 @@
       </p:grpSpPr>
       <p:sp>
         <p:nvSpPr>
-          <p:cNvPr id="180" name="CustomShape 1"/>
+          <p:cNvPr id="181" name="CustomShape 1"/>
           <p:cNvSpPr/>
           <p:nvPr/>
         </p:nvSpPr>
@@ -362,7 +363,7 @@
       </p:grpSpPr>
       <p:sp>
         <p:nvSpPr>
-          <p:cNvPr id="181" name="CustomShape 1"/>
+          <p:cNvPr id="182" name="CustomShape 1"/>
           <p:cNvSpPr/>
           <p:nvPr/>
         </p:nvSpPr>
@@ -404,7 +405,7 @@
       </p:grpSpPr>
       <p:sp>
         <p:nvSpPr>
-          <p:cNvPr id="182" name="CustomShape 1"/>
+          <p:cNvPr id="183" name="CustomShape 1"/>
           <p:cNvSpPr/>
           <p:nvPr/>
         </p:nvSpPr>
@@ -446,7 +447,7 @@
       </p:grpSpPr>
       <p:sp>
         <p:nvSpPr>
-          <p:cNvPr id="183" name="CustomShape 1"/>
+          <p:cNvPr id="184" name="CustomShape 1"/>
           <p:cNvSpPr/>
           <p:nvPr/>
         </p:nvSpPr>
@@ -488,7 +489,91 @@
       </p:grpSpPr>
       <p:sp>
         <p:nvSpPr>
-          <p:cNvPr id="184" name="CustomShape 1"/>
+          <p:cNvPr id="185" name="CustomShape 1"/>
+          <p:cNvSpPr/>
+          <p:nvPr/>
+        </p:nvSpPr>
+        <p:spPr>
+          <a:xfrm>
+            <a:off x="777960" y="4776840"/>
+            <a:ext cx="6215400" cy="4524840"/>
+          </a:xfrm>
+          <a:prstGeom prst="rect">
+            <a:avLst/>
+          </a:prstGeom>
+          <a:noFill/>
+          <a:ln>
+            <a:noFill/>
+          </a:ln>
+        </p:spPr>
+      </p:sp>
+    </p:spTree>
+  </p:cSld>
+</p:notes>
+</file>
+
+<file path=ppt/notesSlides/notesSlide16.xml><?xml version="1.0" encoding="utf-8"?>
+<p:notes xmlns:a="http://schemas.openxmlformats.org/drawingml/2006/main" xmlns:p="http://schemas.openxmlformats.org/presentationml/2006/main" xmlns:r="http://schemas.openxmlformats.org/officeDocument/2006/relationships">
+  <p:cSld>
+    <p:spTree>
+      <p:nvGrpSpPr>
+        <p:cNvPr id="1" name=""/>
+        <p:cNvGrpSpPr/>
+        <p:nvPr/>
+      </p:nvGrpSpPr>
+      <p:grpSpPr>
+        <a:xfrm>
+          <a:off x="0" y="0"/>
+          <a:ext cx="0" cy="0"/>
+          <a:chOff x="0" y="0"/>
+          <a:chExt cx="0" cy="0"/>
+        </a:xfrm>
+      </p:grpSpPr>
+      <p:sp>
+        <p:nvSpPr>
+          <p:cNvPr id="186" name="CustomShape 1"/>
+          <p:cNvSpPr/>
+          <p:nvPr/>
+        </p:nvSpPr>
+        <p:spPr>
+          <a:xfrm>
+            <a:off x="777960" y="4776840"/>
+            <a:ext cx="6215400" cy="4524840"/>
+          </a:xfrm>
+          <a:prstGeom prst="rect">
+            <a:avLst/>
+          </a:prstGeom>
+          <a:noFill/>
+          <a:ln>
+            <a:noFill/>
+          </a:ln>
+        </p:spPr>
+      </p:sp>
+    </p:spTree>
+  </p:cSld>
+</p:notes>
+</file>
+
+<file path=ppt/notesSlides/notesSlide17.xml><?xml version="1.0" encoding="utf-8"?>
+<p:notes xmlns:a="http://schemas.openxmlformats.org/drawingml/2006/main" xmlns:p="http://schemas.openxmlformats.org/presentationml/2006/main" xmlns:r="http://schemas.openxmlformats.org/officeDocument/2006/relationships">
+  <p:cSld>
+    <p:spTree>
+      <p:nvGrpSpPr>
+        <p:cNvPr id="1" name=""/>
+        <p:cNvGrpSpPr/>
+        <p:nvPr/>
+      </p:nvGrpSpPr>
+      <p:grpSpPr>
+        <a:xfrm>
+          <a:off x="0" y="0"/>
+          <a:ext cx="0" cy="0"/>
+          <a:chOff x="0" y="0"/>
+          <a:chExt cx="0" cy="0"/>
+        </a:xfrm>
+      </p:grpSpPr>
+      <p:sp>
+        <p:nvSpPr>
+          <p:cNvPr id="187" name="CustomShape 1"/>
           <p:cNvSpPr/>
           <p:nvPr/>
         </p:nvSpPr>
@@ -530,7 +615,7 @@
       </p:grpSpPr>
       <p:sp>
         <p:nvSpPr>
-          <p:cNvPr id="171" name="CustomShape 1"/>
+          <p:cNvPr id="172" name="CustomShape 1"/>
           <p:cNvSpPr/>
           <p:nvPr/>
         </p:nvSpPr>
@@ -572,7 +657,7 @@
       </p:grpSpPr>
       <p:sp>
         <p:nvSpPr>
-          <p:cNvPr id="172" name="CustomShape 1"/>
+          <p:cNvPr id="173" name="CustomShape 1"/>
           <p:cNvSpPr/>
           <p:nvPr/>
         </p:nvSpPr>
@@ -614,7 +699,7 @@
       </p:grpSpPr>
       <p:sp>
         <p:nvSpPr>
-          <p:cNvPr id="173" name="CustomShape 1"/>
+          <p:cNvPr id="174" name="CustomShape 1"/>
           <p:cNvSpPr/>
           <p:nvPr/>
         </p:nvSpPr>
@@ -656,7 +741,7 @@
       </p:grpSpPr>
       <p:sp>
         <p:nvSpPr>
-          <p:cNvPr id="174" name="CustomShape 1"/>
+          <p:cNvPr id="175" name="CustomShape 1"/>
           <p:cNvSpPr/>
           <p:nvPr/>
         </p:nvSpPr>
@@ -698,7 +783,7 @@
       </p:grpSpPr>
       <p:sp>
         <p:nvSpPr>
-          <p:cNvPr id="175" name="CustomShape 1"/>
+          <p:cNvPr id="176" name="CustomShape 1"/>
           <p:cNvSpPr/>
           <p:nvPr/>
         </p:nvSpPr>
@@ -740,7 +825,7 @@
       </p:grpSpPr>
       <p:sp>
         <p:nvSpPr>
-          <p:cNvPr id="176" name="CustomShape 1"/>
+          <p:cNvPr id="177" name="CustomShape 1"/>
           <p:cNvSpPr/>
           <p:nvPr/>
         </p:nvSpPr>
@@ -782,7 +867,7 @@
       </p:grpSpPr>
       <p:sp>
         <p:nvSpPr>
-          <p:cNvPr id="177" name="CustomShape 1"/>
+          <p:cNvPr id="178" name="CustomShape 1"/>
           <p:cNvSpPr/>
           <p:nvPr/>
         </p:nvSpPr>
@@ -824,7 +909,7 @@
       </p:grpSpPr>
       <p:sp>
         <p:nvSpPr>
-          <p:cNvPr id="178" name="CustomShape 1"/>
+          <p:cNvPr id="179" name="CustomShape 1"/>
           <p:cNvSpPr/>
           <p:nvPr/>
         </p:nvSpPr>
@@ -899,7 +984,7 @@
         <p:spPr>
           <a:xfrm>
             <a:off x="504000" y="301320"/>
-            <a:ext cx="9071640" cy="1262160"/>
+            <a:ext cx="9072000" cy="1262160"/>
           </a:xfrm>
           <a:prstGeom prst="rect">
             <a:avLst/>
@@ -926,7 +1011,7 @@
         <p:spPr>
           <a:xfrm>
             <a:off x="504000" y="1768680"/>
-            <a:ext cx="9071640" cy="2090880"/>
+            <a:ext cx="9072000" cy="2090880"/>
           </a:xfrm>
           <a:prstGeom prst="rect">
             <a:avLst/>
@@ -952,7 +1037,7 @@
         <p:spPr>
           <a:xfrm>
             <a:off x="504000" y="4058640"/>
-            <a:ext cx="9071640" cy="2090880"/>
+            <a:ext cx="9072000" cy="2090880"/>
           </a:xfrm>
           <a:prstGeom prst="rect">
             <a:avLst/>
@@ -1000,7 +1085,7 @@
         <p:spPr>
           <a:xfrm>
             <a:off x="504000" y="301320"/>
-            <a:ext cx="9071640" cy="1262160"/>
+            <a:ext cx="9072000" cy="1262160"/>
           </a:xfrm>
           <a:prstGeom prst="rect">
             <a:avLst/>
@@ -1153,7 +1238,7 @@
         <p:spPr>
           <a:xfrm>
             <a:off x="504000" y="301320"/>
-            <a:ext cx="9071640" cy="1262160"/>
+            <a:ext cx="9072000" cy="1262160"/>
           </a:xfrm>
           <a:prstGeom prst="rect">
             <a:avLst/>
@@ -1180,7 +1265,7 @@
         <p:spPr>
           <a:xfrm>
             <a:off x="504000" y="1768680"/>
-            <a:ext cx="9071640" cy="4383720"/>
+            <a:ext cx="9072000" cy="4384080"/>
           </a:xfrm>
           <a:prstGeom prst="rect">
             <a:avLst/>
@@ -1206,7 +1291,7 @@
         <p:spPr>
           <a:xfrm>
             <a:off x="504000" y="1768680"/>
-            <a:ext cx="9071640" cy="4383720"/>
+            <a:ext cx="9072000" cy="4384080"/>
           </a:xfrm>
           <a:prstGeom prst="rect">
             <a:avLst/>
@@ -1233,8 +1318,8 @@
         </p:blipFill>
         <p:spPr>
           <a:xfrm>
-            <a:off x="2292480" y="1768320"/>
-            <a:ext cx="5494320" cy="4383720"/>
+            <a:off x="2292480" y="1768680"/>
+            <a:ext cx="5494680" cy="4384080"/>
           </a:xfrm>
           <a:prstGeom prst="rect">
             <a:avLst/>
@@ -1258,8 +1343,8 @@
         </p:blipFill>
         <p:spPr>
           <a:xfrm>
-            <a:off x="2292480" y="1768320"/>
-            <a:ext cx="5494320" cy="4383720"/>
+            <a:off x="2292480" y="1768680"/>
+            <a:ext cx="5494680" cy="4384080"/>
           </a:xfrm>
           <a:prstGeom prst="rect">
             <a:avLst/>
@@ -1326,7 +1411,7 @@
         <p:spPr>
           <a:xfrm>
             <a:off x="504000" y="301320"/>
-            <a:ext cx="9071640" cy="1262160"/>
+            <a:ext cx="9072000" cy="1262160"/>
           </a:xfrm>
           <a:prstGeom prst="rect">
             <a:avLst/>
@@ -1353,7 +1438,7 @@
         <p:spPr>
           <a:xfrm>
             <a:off x="504000" y="1768680"/>
-            <a:ext cx="9071640" cy="4384080"/>
+            <a:ext cx="9072000" cy="4384440"/>
           </a:xfrm>
           <a:prstGeom prst="rect">
             <a:avLst/>
@@ -1402,7 +1487,7 @@
         <p:spPr>
           <a:xfrm>
             <a:off x="504000" y="301320"/>
-            <a:ext cx="9071640" cy="1262160"/>
+            <a:ext cx="9072000" cy="1262160"/>
           </a:xfrm>
           <a:prstGeom prst="rect">
             <a:avLst/>
@@ -1429,7 +1514,7 @@
         <p:spPr>
           <a:xfrm>
             <a:off x="504000" y="1768680"/>
-            <a:ext cx="9071640" cy="4383720"/>
+            <a:ext cx="9072000" cy="4384080"/>
           </a:xfrm>
           <a:prstGeom prst="rect">
             <a:avLst/>
@@ -1477,7 +1562,7 @@
         <p:spPr>
           <a:xfrm>
             <a:off x="504000" y="301320"/>
-            <a:ext cx="9071640" cy="1262160"/>
+            <a:ext cx="9072000" cy="1262160"/>
           </a:xfrm>
           <a:prstGeom prst="rect">
             <a:avLst/>
@@ -1504,7 +1589,7 @@
         <p:spPr>
           <a:xfrm>
             <a:off x="504000" y="1768680"/>
-            <a:ext cx="4426920" cy="4383720"/>
+            <a:ext cx="4426920" cy="4384080"/>
           </a:xfrm>
           <a:prstGeom prst="rect">
             <a:avLst/>
@@ -1530,7 +1615,7 @@
         <p:spPr>
           <a:xfrm>
             <a:off x="5152680" y="1768680"/>
-            <a:ext cx="4426920" cy="4383720"/>
+            <a:ext cx="4426920" cy="4384080"/>
           </a:xfrm>
           <a:prstGeom prst="rect">
             <a:avLst/>
@@ -1578,7 +1663,7 @@
         <p:spPr>
           <a:xfrm>
             <a:off x="504000" y="301320"/>
-            <a:ext cx="9071640" cy="1262160"/>
+            <a:ext cx="9072000" cy="1262160"/>
           </a:xfrm>
           <a:prstGeom prst="rect">
             <a:avLst/>
@@ -1627,7 +1712,7 @@
         <p:spPr>
           <a:xfrm>
             <a:off x="504000" y="301320"/>
-            <a:ext cx="9071640" cy="5850720"/>
+            <a:ext cx="9072000" cy="5850720"/>
           </a:xfrm>
           <a:prstGeom prst="rect">
             <a:avLst/>
@@ -1676,7 +1761,7 @@
         <p:spPr>
           <a:xfrm>
             <a:off x="504000" y="301320"/>
-            <a:ext cx="9071640" cy="1262160"/>
+            <a:ext cx="9072000" cy="1262160"/>
           </a:xfrm>
           <a:prstGeom prst="rect">
             <a:avLst/>
@@ -1755,7 +1840,7 @@
         <p:spPr>
           <a:xfrm>
             <a:off x="5152680" y="1768680"/>
-            <a:ext cx="4426920" cy="4383720"/>
+            <a:ext cx="4426920" cy="4384080"/>
           </a:xfrm>
           <a:prstGeom prst="rect">
             <a:avLst/>
@@ -1803,7 +1888,7 @@
         <p:spPr>
           <a:xfrm>
             <a:off x="504000" y="301320"/>
-            <a:ext cx="9071640" cy="1262160"/>
+            <a:ext cx="9072000" cy="1262160"/>
           </a:xfrm>
           <a:prstGeom prst="rect">
             <a:avLst/>
@@ -1830,7 +1915,7 @@
         <p:spPr>
           <a:xfrm>
             <a:off x="504000" y="1768680"/>
-            <a:ext cx="9071640" cy="4384080"/>
+            <a:ext cx="9072000" cy="4384440"/>
           </a:xfrm>
           <a:prstGeom prst="rect">
             <a:avLst/>
@@ -1879,7 +1964,7 @@
         <p:spPr>
           <a:xfrm>
             <a:off x="504000" y="301320"/>
-            <a:ext cx="9071640" cy="1262160"/>
+            <a:ext cx="9072000" cy="1262160"/>
           </a:xfrm>
           <a:prstGeom prst="rect">
             <a:avLst/>
@@ -1906,7 +1991,7 @@
         <p:spPr>
           <a:xfrm>
             <a:off x="504000" y="1768680"/>
-            <a:ext cx="4426920" cy="4383720"/>
+            <a:ext cx="4426920" cy="4384080"/>
           </a:xfrm>
           <a:prstGeom prst="rect">
             <a:avLst/>
@@ -2006,7 +2091,7 @@
         <p:spPr>
           <a:xfrm>
             <a:off x="504000" y="301320"/>
-            <a:ext cx="9071640" cy="1262160"/>
+            <a:ext cx="9072000" cy="1262160"/>
           </a:xfrm>
           <a:prstGeom prst="rect">
             <a:avLst/>
@@ -2085,7 +2170,7 @@
         <p:spPr>
           <a:xfrm>
             <a:off x="504000" y="4058640"/>
-            <a:ext cx="9071640" cy="2090880"/>
+            <a:ext cx="9072000" cy="2090880"/>
           </a:xfrm>
           <a:prstGeom prst="rect">
             <a:avLst/>
@@ -2133,7 +2218,7 @@
         <p:spPr>
           <a:xfrm>
             <a:off x="504000" y="301320"/>
-            <a:ext cx="9071640" cy="1262160"/>
+            <a:ext cx="9072000" cy="1262160"/>
           </a:xfrm>
           <a:prstGeom prst="rect">
             <a:avLst/>
@@ -2160,7 +2245,7 @@
         <p:spPr>
           <a:xfrm>
             <a:off x="504000" y="1768680"/>
-            <a:ext cx="9071640" cy="2090880"/>
+            <a:ext cx="9072000" cy="2090880"/>
           </a:xfrm>
           <a:prstGeom prst="rect">
             <a:avLst/>
@@ -2186,7 +2271,7 @@
         <p:spPr>
           <a:xfrm>
             <a:off x="504000" y="4058640"/>
-            <a:ext cx="9071640" cy="2090880"/>
+            <a:ext cx="9072000" cy="2090880"/>
           </a:xfrm>
           <a:prstGeom prst="rect">
             <a:avLst/>
@@ -2234,7 +2319,7 @@
         <p:spPr>
           <a:xfrm>
             <a:off x="504000" y="301320"/>
-            <a:ext cx="9071640" cy="1262160"/>
+            <a:ext cx="9072000" cy="1262160"/>
           </a:xfrm>
           <a:prstGeom prst="rect">
             <a:avLst/>
@@ -2387,7 +2472,7 @@
         <p:spPr>
           <a:xfrm>
             <a:off x="504000" y="301320"/>
-            <a:ext cx="9071640" cy="1262160"/>
+            <a:ext cx="9072000" cy="1262160"/>
           </a:xfrm>
           <a:prstGeom prst="rect">
             <a:avLst/>
@@ -2414,7 +2499,7 @@
         <p:spPr>
           <a:xfrm>
             <a:off x="504000" y="1768680"/>
-            <a:ext cx="9071640" cy="4383720"/>
+            <a:ext cx="9072000" cy="4384080"/>
           </a:xfrm>
           <a:prstGeom prst="rect">
             <a:avLst/>
@@ -2440,7 +2525,7 @@
         <p:spPr>
           <a:xfrm>
             <a:off x="504000" y="1768680"/>
-            <a:ext cx="9071640" cy="4383720"/>
+            <a:ext cx="9072000" cy="4384080"/>
           </a:xfrm>
           <a:prstGeom prst="rect">
             <a:avLst/>
@@ -2467,8 +2552,8 @@
         </p:blipFill>
         <p:spPr>
           <a:xfrm>
-            <a:off x="2292480" y="1768320"/>
-            <a:ext cx="5494320" cy="4383720"/>
+            <a:off x="2292480" y="1768680"/>
+            <a:ext cx="5494680" cy="4384080"/>
           </a:xfrm>
           <a:prstGeom prst="rect">
             <a:avLst/>
@@ -2492,8 +2577,8 @@
         </p:blipFill>
         <p:spPr>
           <a:xfrm>
-            <a:off x="2292480" y="1768320"/>
-            <a:ext cx="5494320" cy="4383720"/>
+            <a:off x="2292480" y="1768680"/>
+            <a:ext cx="5494680" cy="4384080"/>
           </a:xfrm>
           <a:prstGeom prst="rect">
             <a:avLst/>
@@ -2560,7 +2645,7 @@
         <p:spPr>
           <a:xfrm>
             <a:off x="504000" y="301320"/>
-            <a:ext cx="9071640" cy="1262160"/>
+            <a:ext cx="9072000" cy="1262160"/>
           </a:xfrm>
           <a:prstGeom prst="rect">
             <a:avLst/>
@@ -2587,7 +2672,7 @@
         <p:spPr>
           <a:xfrm>
             <a:off x="504000" y="1768680"/>
-            <a:ext cx="9071640" cy="4384080"/>
+            <a:ext cx="9072000" cy="4384440"/>
           </a:xfrm>
           <a:prstGeom prst="rect">
             <a:avLst/>
@@ -2636,7 +2721,7 @@
         <p:spPr>
           <a:xfrm>
             <a:off x="504000" y="301320"/>
-            <a:ext cx="9071640" cy="1262160"/>
+            <a:ext cx="9072000" cy="1262160"/>
           </a:xfrm>
           <a:prstGeom prst="rect">
             <a:avLst/>
@@ -2663,7 +2748,7 @@
         <p:spPr>
           <a:xfrm>
             <a:off x="504000" y="1768680"/>
-            <a:ext cx="9071640" cy="4383720"/>
+            <a:ext cx="9072000" cy="4384080"/>
           </a:xfrm>
           <a:prstGeom prst="rect">
             <a:avLst/>
@@ -2711,7 +2796,7 @@
         <p:spPr>
           <a:xfrm>
             <a:off x="504000" y="301320"/>
-            <a:ext cx="9071640" cy="1262160"/>
+            <a:ext cx="9072000" cy="1262160"/>
           </a:xfrm>
           <a:prstGeom prst="rect">
             <a:avLst/>
@@ -2738,7 +2823,7 @@
         <p:spPr>
           <a:xfrm>
             <a:off x="504000" y="1768680"/>
-            <a:ext cx="4426920" cy="4383720"/>
+            <a:ext cx="4426920" cy="4384080"/>
           </a:xfrm>
           <a:prstGeom prst="rect">
             <a:avLst/>
@@ -2764,7 +2849,7 @@
         <p:spPr>
           <a:xfrm>
             <a:off x="5152680" y="1768680"/>
-            <a:ext cx="4426920" cy="4383720"/>
+            <a:ext cx="4426920" cy="4384080"/>
           </a:xfrm>
           <a:prstGeom prst="rect">
             <a:avLst/>
@@ -2812,7 +2897,7 @@
         <p:spPr>
           <a:xfrm>
             <a:off x="504000" y="301320"/>
-            <a:ext cx="9071640" cy="1262160"/>
+            <a:ext cx="9072000" cy="1262160"/>
           </a:xfrm>
           <a:prstGeom prst="rect">
             <a:avLst/>
@@ -2861,7 +2946,7 @@
         <p:spPr>
           <a:xfrm>
             <a:off x="504000" y="301320"/>
-            <a:ext cx="9071640" cy="1262160"/>
+            <a:ext cx="9072000" cy="1262160"/>
           </a:xfrm>
           <a:prstGeom prst="rect">
             <a:avLst/>
@@ -2888,7 +2973,7 @@
         <p:spPr>
           <a:xfrm>
             <a:off x="504000" y="1768680"/>
-            <a:ext cx="9071640" cy="4383720"/>
+            <a:ext cx="9072000" cy="4384080"/>
           </a:xfrm>
           <a:prstGeom prst="rect">
             <a:avLst/>
@@ -2936,7 +3021,7 @@
         <p:spPr>
           <a:xfrm>
             <a:off x="504000" y="301320"/>
-            <a:ext cx="9071640" cy="5850720"/>
+            <a:ext cx="9072000" cy="5850720"/>
           </a:xfrm>
           <a:prstGeom prst="rect">
             <a:avLst/>
@@ -2985,7 +3070,7 @@
         <p:spPr>
           <a:xfrm>
             <a:off x="504000" y="301320"/>
-            <a:ext cx="9071640" cy="1262160"/>
+            <a:ext cx="9072000" cy="1262160"/>
           </a:xfrm>
           <a:prstGeom prst="rect">
             <a:avLst/>
@@ -3064,7 +3149,7 @@
         <p:spPr>
           <a:xfrm>
             <a:off x="5152680" y="1768680"/>
-            <a:ext cx="4426920" cy="4383720"/>
+            <a:ext cx="4426920" cy="4384080"/>
           </a:xfrm>
           <a:prstGeom prst="rect">
             <a:avLst/>
@@ -3112,7 +3197,7 @@
         <p:spPr>
           <a:xfrm>
             <a:off x="504000" y="301320"/>
-            <a:ext cx="9071640" cy="1262160"/>
+            <a:ext cx="9072000" cy="1262160"/>
           </a:xfrm>
           <a:prstGeom prst="rect">
             <a:avLst/>
@@ -3139,7 +3224,7 @@
         <p:spPr>
           <a:xfrm>
             <a:off x="504000" y="1768680"/>
-            <a:ext cx="4426920" cy="4383720"/>
+            <a:ext cx="4426920" cy="4384080"/>
           </a:xfrm>
           <a:prstGeom prst="rect">
             <a:avLst/>
@@ -3239,7 +3324,7 @@
         <p:spPr>
           <a:xfrm>
             <a:off x="504000" y="301320"/>
-            <a:ext cx="9071640" cy="1262160"/>
+            <a:ext cx="9072000" cy="1262160"/>
           </a:xfrm>
           <a:prstGeom prst="rect">
             <a:avLst/>
@@ -3318,7 +3403,7 @@
         <p:spPr>
           <a:xfrm>
             <a:off x="504000" y="4058640"/>
-            <a:ext cx="9071640" cy="2090880"/>
+            <a:ext cx="9072000" cy="2090880"/>
           </a:xfrm>
           <a:prstGeom prst="rect">
             <a:avLst/>
@@ -3366,7 +3451,7 @@
         <p:spPr>
           <a:xfrm>
             <a:off x="504000" y="301320"/>
-            <a:ext cx="9071640" cy="1262160"/>
+            <a:ext cx="9072000" cy="1262160"/>
           </a:xfrm>
           <a:prstGeom prst="rect">
             <a:avLst/>
@@ -3393,7 +3478,7 @@
         <p:spPr>
           <a:xfrm>
             <a:off x="504000" y="1768680"/>
-            <a:ext cx="9071640" cy="2090880"/>
+            <a:ext cx="9072000" cy="2090880"/>
           </a:xfrm>
           <a:prstGeom prst="rect">
             <a:avLst/>
@@ -3419,7 +3504,7 @@
         <p:spPr>
           <a:xfrm>
             <a:off x="504000" y="4058640"/>
-            <a:ext cx="9071640" cy="2090880"/>
+            <a:ext cx="9072000" cy="2090880"/>
           </a:xfrm>
           <a:prstGeom prst="rect">
             <a:avLst/>
@@ -3467,7 +3552,7 @@
         <p:spPr>
           <a:xfrm>
             <a:off x="504000" y="301320"/>
-            <a:ext cx="9071640" cy="1262160"/>
+            <a:ext cx="9072000" cy="1262160"/>
           </a:xfrm>
           <a:prstGeom prst="rect">
             <a:avLst/>
@@ -3620,7 +3705,7 @@
         <p:spPr>
           <a:xfrm>
             <a:off x="504000" y="301320"/>
-            <a:ext cx="9071640" cy="1262160"/>
+            <a:ext cx="9072000" cy="1262160"/>
           </a:xfrm>
           <a:prstGeom prst="rect">
             <a:avLst/>
@@ -3647,7 +3732,7 @@
         <p:spPr>
           <a:xfrm>
             <a:off x="504000" y="1768680"/>
-            <a:ext cx="9071640" cy="4383720"/>
+            <a:ext cx="9072000" cy="4384080"/>
           </a:xfrm>
           <a:prstGeom prst="rect">
             <a:avLst/>
@@ -3673,7 +3758,7 @@
         <p:spPr>
           <a:xfrm>
             <a:off x="504000" y="1768680"/>
-            <a:ext cx="9071640" cy="4383720"/>
+            <a:ext cx="9072000" cy="4384080"/>
           </a:xfrm>
           <a:prstGeom prst="rect">
             <a:avLst/>
@@ -3700,8 +3785,8 @@
         </p:blipFill>
         <p:spPr>
           <a:xfrm>
-            <a:off x="2292480" y="1768320"/>
-            <a:ext cx="5494320" cy="4383720"/>
+            <a:off x="2292480" y="1768680"/>
+            <a:ext cx="5494680" cy="4384080"/>
           </a:xfrm>
           <a:prstGeom prst="rect">
             <a:avLst/>
@@ -3725,8 +3810,8 @@
         </p:blipFill>
         <p:spPr>
           <a:xfrm>
-            <a:off x="2292480" y="1768320"/>
-            <a:ext cx="5494320" cy="4383720"/>
+            <a:off x="2292480" y="1768680"/>
+            <a:ext cx="5494680" cy="4384080"/>
           </a:xfrm>
           <a:prstGeom prst="rect">
             <a:avLst/>
@@ -3771,7 +3856,7 @@
         <p:spPr>
           <a:xfrm>
             <a:off x="504000" y="301320"/>
-            <a:ext cx="9071640" cy="1262160"/>
+            <a:ext cx="9072000" cy="1262160"/>
           </a:xfrm>
           <a:prstGeom prst="rect">
             <a:avLst/>
@@ -3798,7 +3883,7 @@
         <p:spPr>
           <a:xfrm>
             <a:off x="504000" y="1768680"/>
-            <a:ext cx="4426920" cy="4383720"/>
+            <a:ext cx="4426920" cy="4384080"/>
           </a:xfrm>
           <a:prstGeom prst="rect">
             <a:avLst/>
@@ -3824,7 +3909,7 @@
         <p:spPr>
           <a:xfrm>
             <a:off x="5152680" y="1768680"/>
-            <a:ext cx="4426920" cy="4383720"/>
+            <a:ext cx="4426920" cy="4384080"/>
           </a:xfrm>
           <a:prstGeom prst="rect">
             <a:avLst/>
@@ -3872,7 +3957,7 @@
         <p:spPr>
           <a:xfrm>
             <a:off x="504000" y="301320"/>
-            <a:ext cx="9071640" cy="1262160"/>
+            <a:ext cx="9072000" cy="1262160"/>
           </a:xfrm>
           <a:prstGeom prst="rect">
             <a:avLst/>
@@ -3921,7 +4006,7 @@
         <p:spPr>
           <a:xfrm>
             <a:off x="504000" y="301320"/>
-            <a:ext cx="9071640" cy="5850720"/>
+            <a:ext cx="9072000" cy="5850720"/>
           </a:xfrm>
           <a:prstGeom prst="rect">
             <a:avLst/>
@@ -3970,7 +4055,7 @@
         <p:spPr>
           <a:xfrm>
             <a:off x="504000" y="301320"/>
-            <a:ext cx="9071640" cy="1262160"/>
+            <a:ext cx="9072000" cy="1262160"/>
           </a:xfrm>
           <a:prstGeom prst="rect">
             <a:avLst/>
@@ -4049,7 +4134,7 @@
         <p:spPr>
           <a:xfrm>
             <a:off x="5152680" y="1768680"/>
-            <a:ext cx="4426920" cy="4383720"/>
+            <a:ext cx="4426920" cy="4384080"/>
           </a:xfrm>
           <a:prstGeom prst="rect">
             <a:avLst/>
@@ -4097,7 +4182,7 @@
         <p:spPr>
           <a:xfrm>
             <a:off x="504000" y="301320"/>
-            <a:ext cx="9071640" cy="1262160"/>
+            <a:ext cx="9072000" cy="1262160"/>
           </a:xfrm>
           <a:prstGeom prst="rect">
             <a:avLst/>
@@ -4124,7 +4209,7 @@
         <p:spPr>
           <a:xfrm>
             <a:off x="504000" y="1768680"/>
-            <a:ext cx="4426920" cy="4383720"/>
+            <a:ext cx="4426920" cy="4384080"/>
           </a:xfrm>
           <a:prstGeom prst="rect">
             <a:avLst/>
@@ -4224,7 +4309,7 @@
         <p:spPr>
           <a:xfrm>
             <a:off x="504000" y="301320"/>
-            <a:ext cx="9071640" cy="1262160"/>
+            <a:ext cx="9072000" cy="1262160"/>
           </a:xfrm>
           <a:prstGeom prst="rect">
             <a:avLst/>
@@ -4303,7 +4388,7 @@
         <p:spPr>
           <a:xfrm>
             <a:off x="504000" y="4058640"/>
-            <a:ext cx="9071640" cy="2090880"/>
+            <a:ext cx="9072000" cy="2090880"/>
           </a:xfrm>
           <a:prstGeom prst="rect">
             <a:avLst/>
@@ -6150,7 +6235,7 @@
         <p:spPr>
           <a:xfrm>
             <a:off x="432360" y="2627640"/>
-            <a:ext cx="6983640" cy="3708360"/>
+            <a:ext cx="6983640" cy="2916360"/>
           </a:xfrm>
           <a:prstGeom prst="rect">
             <a:avLst/>
@@ -6174,6 +6259,34 @@
               <a:rPr lang="en-GB" sz="1400">
                 <a:latin typeface="Arial"/>
               </a:rPr>
+              <a:t>import mne</a:t>
+            </a:r>
+            <a:endParaRPr/>
+          </a:p>
+          <a:p>
+            <a:pPr>
+              <a:lnSpc>
+                <a:spcPct val="100000"/>
+              </a:lnSpc>
+            </a:pPr>
+            <a:r>
+              <a:rPr lang="en-GB" sz="1400">
+                <a:latin typeface="Arial"/>
+              </a:rPr>
+              <a:t>import numpy as np</a:t>
+            </a:r>
+            <a:endParaRPr/>
+          </a:p>
+          <a:p>
+            <a:pPr>
+              <a:lnSpc>
+                <a:spcPct val="100000"/>
+              </a:lnSpc>
+            </a:pPr>
+            <a:r>
+              <a:rPr lang="en-GB" sz="1400">
+                <a:latin typeface="Arial"/>
+              </a:rPr>
               <a:t>from mne.datasets import sample</a:t>
             </a:r>
             <a:endParaRPr/>
@@ -6188,7 +6301,7 @@
               <a:rPr lang="en-GB" sz="1400">
                 <a:latin typeface="Arial"/>
               </a:rPr>
-              <a:t>from mne.minimum_norm import read_inverse_operator</a:t>
+              <a:t>subject_from = 'aliceOhad'</a:t>
             </a:r>
             <a:endParaRPr/>
           </a:p>
@@ -6202,7 +6315,7 @@
               <a:rPr lang="en-GB" sz="1400">
                 <a:latin typeface="Arial"/>
               </a:rPr>
-              <a:t>from mne import read_evokeds</a:t>
+              <a:t>subject_to = 'fsaverage'</a:t>
             </a:r>
             <a:endParaRPr/>
           </a:p>
@@ -6216,7 +6329,7 @@
               <a:rPr lang="en-GB" sz="1400">
                 <a:latin typeface="Arial"/>
               </a:rPr>
-              <a:t>from mne.minimum_norm import apply_inverse, read_inverse_operator</a:t>
+              <a:t>fname='mne_dSPM_inverse'</a:t>
             </a:r>
             <a:endParaRPr/>
           </a:p>
@@ -6230,7 +6343,7 @@
               <a:rPr lang="en-GB" sz="1400">
                 <a:latin typeface="Arial"/>
               </a:rPr>
-              <a:t>fname_evoked='ft_WbW-ave.fif'</a:t>
+              <a:t>stc_from = mne.read_source_estimate(fname)</a:t>
             </a:r>
             <a:endParaRPr/>
           </a:p>
@@ -6244,7 +6357,7 @@
               <a:rPr lang="en-GB" sz="1400">
                 <a:latin typeface="Arial"/>
               </a:rPr>
-              <a:t>fname_inv = 'ohad_raw-oct-6-meg-inv.fif' </a:t>
+              <a:t>vertices_to = [np.arange(10242), np.arange(10242)]</a:t>
             </a:r>
             <a:endParaRPr/>
           </a:p>
@@ -6258,7 +6371,7 @@
               <a:rPr lang="en-GB" sz="1400">
                 <a:latin typeface="Arial"/>
               </a:rPr>
-              <a:t>snr = 3.0</a:t>
+              <a:t>stc_to = mne.morph_data(subject_from, subject_to, stc_from, n_jobs=1, grade=vertices_to)</a:t>
             </a:r>
             <a:endParaRPr/>
           </a:p>
@@ -6272,107 +6385,7 @@
               <a:rPr lang="en-GB" sz="1400">
                 <a:latin typeface="Arial"/>
               </a:rPr>
-              <a:t>lambda2 = 1.0 / snr ** 2</a:t>
-            </a:r>
-            <a:endParaRPr/>
-          </a:p>
-          <a:p>
-            <a:pPr>
-              <a:lnSpc>
-                <a:spcPct val="100000"/>
-              </a:lnSpc>
-            </a:pPr>
-            <a:r>
-              <a:rPr lang="en-GB" sz="1400">
-                <a:latin typeface="Arial"/>
-              </a:rPr>
-              <a:t>method = "dSPM"  # use dSPM method (could also be MNE or sLORETA)</a:t>
-            </a:r>
-            <a:endParaRPr/>
-          </a:p>
-          <a:p>
-            <a:pPr>
-              <a:lnSpc>
-                <a:spcPct val="100000"/>
-              </a:lnSpc>
-            </a:pPr>
-            <a:endParaRPr/>
-          </a:p>
-          <a:p>
-            <a:pPr>
-              <a:lnSpc>
-                <a:spcPct val="100000"/>
-              </a:lnSpc>
-            </a:pPr>
-            <a:r>
-              <a:rPr lang="en-GB" sz="1400">
-                <a:latin typeface="Arial"/>
-              </a:rPr>
-              <a:t># Load data</a:t>
-            </a:r>
-            <a:endParaRPr/>
-          </a:p>
-          <a:p>
-            <a:pPr>
-              <a:lnSpc>
-                <a:spcPct val="100000"/>
-              </a:lnSpc>
-            </a:pPr>
-            <a:r>
-              <a:rPr lang="en-GB" sz="1400">
-                <a:latin typeface="Arial"/>
-              </a:rPr>
-              <a:t>evoked = read_evokeds(fname_evoked, condition=0, baseline=(None, 0))</a:t>
-            </a:r>
-            <a:endParaRPr/>
-          </a:p>
-          <a:p>
-            <a:pPr>
-              <a:lnSpc>
-                <a:spcPct val="100000"/>
-              </a:lnSpc>
-            </a:pPr>
-            <a:r>
-              <a:rPr lang="en-GB" sz="1400">
-                <a:latin typeface="Arial"/>
-              </a:rPr>
-              <a:t>inverse_operator = read_inverse_operator(fname_inv)</a:t>
-            </a:r>
-            <a:endParaRPr/>
-          </a:p>
-          <a:p>
-            <a:pPr>
-              <a:lnSpc>
-                <a:spcPct val="100000"/>
-              </a:lnSpc>
-            </a:pPr>
-            <a:endParaRPr/>
-          </a:p>
-          <a:p>
-            <a:pPr>
-              <a:lnSpc>
-                <a:spcPct val="100000"/>
-              </a:lnSpc>
-            </a:pPr>
-            <a:r>
-              <a:rPr lang="en-GB" sz="1400">
-                <a:latin typeface="Arial"/>
-              </a:rPr>
-              <a:t>stc = apply_inverse(evoked, inverse_operator, lambda2, method, pick_ori=None)</a:t>
-            </a:r>
-            <a:endParaRPr/>
-          </a:p>
-          <a:p>
-            <a:pPr>
-              <a:lnSpc>
-                <a:spcPct val="100000"/>
-              </a:lnSpc>
-            </a:pPr>
-            <a:r>
-              <a:rPr lang="en-GB" sz="1400">
-                <a:latin typeface="Arial"/>
-              </a:rPr>
-              <a:t>stc.save('mne_%s_inverse' % method)</a:t>
+              <a:t>stc_to.save('%s_wbw-meg' % subject_to)</a:t>
             </a:r>
             <a:endParaRPr/>
           </a:p>
@@ -6468,7 +6481,7 @@
               <a:rPr b="1" lang="en-GB" sz="4100">
                 <a:latin typeface="Arial"/>
               </a:rPr>
-              <a:t>mne_analyze</a:t>
+              <a:t>MNE pipeline</a:t>
             </a:r>
             <a:endParaRPr/>
           </a:p>
@@ -6482,8 +6495,8 @@
         </p:nvSpPr>
         <p:spPr>
           <a:xfrm>
-            <a:off x="506520" y="1875960"/>
-            <a:ext cx="9068040" cy="1721520"/>
+            <a:off x="502920" y="2165400"/>
+            <a:ext cx="9068400" cy="4673880"/>
           </a:xfrm>
           <a:prstGeom prst="rect">
             <a:avLst/>
@@ -6502,40 +6515,498 @@
               </a:lnSpc>
             </a:pPr>
             <a:r>
-              <a:rPr lang="en-GB" sz="2600">
-                <a:latin typeface="Arial"/>
-              </a:rPr>
-              <a:t>We used it for corregistration, now for visualizing sources</a:t>
-            </a:r>
-            <a:endParaRPr/>
-          </a:p>
-        </p:txBody>
-      </p:sp>
-      <p:pic>
-        <p:nvPicPr>
-          <p:cNvPr id="159" name="" descr=""/>
-          <p:cNvPicPr/>
+              <a:rPr lang="en-GB" sz="2200">
+                <a:latin typeface="Arial"/>
+              </a:rPr>
+              <a:t>Use PySurfer to view the results</a:t>
+            </a:r>
+            <a:endParaRPr/>
+          </a:p>
+          <a:p>
+            <a:pPr>
+              <a:lnSpc>
+                <a:spcPct val="100000"/>
+              </a:lnSpc>
+            </a:pPr>
+            <a:endParaRPr/>
+          </a:p>
+          <a:p>
+            <a:pPr>
+              <a:lnSpc>
+                <a:spcPct val="100000"/>
+              </a:lnSpc>
+            </a:pPr>
+            <a:endParaRPr/>
+          </a:p>
+        </p:txBody>
+      </p:sp>
+      <p:sp>
+        <p:nvSpPr>
+          <p:cNvPr id="159" name="CustomShape 3"/>
+          <p:cNvSpPr/>
           <p:nvPr/>
-        </p:nvPicPr>
-        <p:blipFill>
-          <a:blip r:embed="rId2"/>
-          <a:stretch>
-            <a:fillRect/>
-          </a:stretch>
-        </p:blipFill>
-        <p:spPr>
-          <a:xfrm>
-            <a:off x="-9360" y="2303640"/>
-            <a:ext cx="10077840" cy="4546800"/>
-          </a:xfrm>
-          <a:prstGeom prst="rect">
-            <a:avLst/>
-          </a:prstGeom>
+        </p:nvSpPr>
+        <p:spPr>
+          <a:xfrm>
+            <a:off x="432360" y="2627640"/>
+            <a:ext cx="6983640" cy="4068360"/>
+          </a:xfrm>
+          <a:prstGeom prst="rect">
+            <a:avLst/>
+          </a:prstGeom>
+          <a:solidFill>
+            <a:srgbClr val="ffffff"/>
+          </a:solidFill>
           <a:ln>
             <a:noFill/>
           </a:ln>
         </p:spPr>
-      </p:pic>
+        <p:txBody>
+          <a:bodyPr lIns="90000" rIns="90000" tIns="45000" bIns="45000"/>
+          <a:p>
+            <a:pPr>
+              <a:lnSpc>
+                <a:spcPct val="100000"/>
+              </a:lnSpc>
+            </a:pPr>
+            <a:r>
+              <a:rPr lang="en-GB" sz="1000">
+                <a:solidFill>
+                  <a:srgbClr val="0000ff"/>
+                </a:solidFill>
+                <a:latin typeface="Arial"/>
+              </a:rPr>
+              <a:t># for the figure to open well run this script</a:t>
+            </a:r>
+            <a:endParaRPr/>
+          </a:p>
+          <a:p>
+            <a:pPr>
+              <a:lnSpc>
+                <a:spcPct val="100000"/>
+              </a:lnSpc>
+            </a:pPr>
+            <a:r>
+              <a:rPr lang="en-GB" sz="1000">
+                <a:solidFill>
+                  <a:srgbClr val="0000ff"/>
+                </a:solidFill>
+                <a:latin typeface="Arial"/>
+              </a:rPr>
+              <a:t># in ipython, call it like this:  </a:t>
+            </a:r>
+            <a:r>
+              <a:rPr lang="en-GB" sz="1000">
+                <a:solidFill>
+                  <a:srgbClr val="ff3333"/>
+                </a:solidFill>
+                <a:latin typeface="Arial"/>
+              </a:rPr>
+              <a:t> ipython --gui=wx</a:t>
+            </a:r>
+            <a:endParaRPr/>
+          </a:p>
+          <a:p>
+            <a:pPr>
+              <a:lnSpc>
+                <a:spcPct val="100000"/>
+              </a:lnSpc>
+            </a:pPr>
+            <a:endParaRPr/>
+          </a:p>
+          <a:p>
+            <a:pPr>
+              <a:lnSpc>
+                <a:spcPct val="100000"/>
+              </a:lnSpc>
+            </a:pPr>
+            <a:r>
+              <a:rPr lang="en-GB" sz="1000">
+                <a:solidFill>
+                  <a:srgbClr val="0000ff"/>
+                </a:solidFill>
+                <a:latin typeface="Arial"/>
+              </a:rPr>
+              <a:t>#taken from http://pysurfer.github.io/auto_examples/plot_meg_inverse_solution.html</a:t>
+            </a:r>
+            <a:endParaRPr/>
+          </a:p>
+          <a:p>
+            <a:pPr>
+              <a:lnSpc>
+                <a:spcPct val="100000"/>
+              </a:lnSpc>
+            </a:pPr>
+            <a:endParaRPr/>
+          </a:p>
+          <a:p>
+            <a:pPr>
+              <a:lnSpc>
+                <a:spcPct val="100000"/>
+              </a:lnSpc>
+            </a:pPr>
+            <a:r>
+              <a:rPr lang="en-GB" sz="1000">
+                <a:solidFill>
+                  <a:srgbClr val="000000"/>
+                </a:solidFill>
+                <a:latin typeface="Arial"/>
+              </a:rPr>
+              <a:t>import numpy as np</a:t>
+            </a:r>
+            <a:endParaRPr/>
+          </a:p>
+          <a:p>
+            <a:pPr>
+              <a:lnSpc>
+                <a:spcPct val="100000"/>
+              </a:lnSpc>
+            </a:pPr>
+            <a:r>
+              <a:rPr lang="en-GB" sz="1000">
+                <a:solidFill>
+                  <a:srgbClr val="000000"/>
+                </a:solidFill>
+                <a:latin typeface="Arial"/>
+              </a:rPr>
+              <a:t>from surfer import Brain, TimeViewer</a:t>
+            </a:r>
+            <a:endParaRPr/>
+          </a:p>
+          <a:p>
+            <a:pPr>
+              <a:lnSpc>
+                <a:spcPct val="100000"/>
+              </a:lnSpc>
+            </a:pPr>
+            <a:r>
+              <a:rPr lang="en-GB" sz="1000">
+                <a:solidFill>
+                  <a:srgbClr val="000000"/>
+                </a:solidFill>
+                <a:latin typeface="Arial"/>
+              </a:rPr>
+              <a:t>from surfer.io import read_stc</a:t>
+            </a:r>
+            <a:endParaRPr/>
+          </a:p>
+          <a:p>
+            <a:pPr>
+              <a:lnSpc>
+                <a:spcPct val="100000"/>
+              </a:lnSpc>
+            </a:pPr>
+            <a:r>
+              <a:rPr lang="en-GB" sz="1000">
+                <a:solidFill>
+                  <a:srgbClr val="000000"/>
+                </a:solidFill>
+                <a:latin typeface="Arial"/>
+              </a:rPr>
+              <a:t>brain = Brain('fsaverage', 'both', 'pial', views='caudal')</a:t>
+            </a:r>
+            <a:endParaRPr/>
+          </a:p>
+          <a:p>
+            <a:pPr>
+              <a:lnSpc>
+                <a:spcPct val="100000"/>
+              </a:lnSpc>
+            </a:pPr>
+            <a:r>
+              <a:rPr lang="en-GB" sz="1000">
+                <a:solidFill>
+                  <a:srgbClr val="000000"/>
+                </a:solidFill>
+                <a:latin typeface="Arial"/>
+              </a:rPr>
+              <a:t>stc = read_stc('fsaverage_wbw-meg-lh.stc')</a:t>
+            </a:r>
+            <a:endParaRPr/>
+          </a:p>
+          <a:p>
+            <a:pPr>
+              <a:lnSpc>
+                <a:spcPct val="100000"/>
+              </a:lnSpc>
+            </a:pPr>
+            <a:r>
+              <a:rPr lang="en-GB" sz="1000">
+                <a:solidFill>
+                  <a:srgbClr val="000000"/>
+                </a:solidFill>
+                <a:latin typeface="Arial"/>
+              </a:rPr>
+              <a:t>data = stc['data']</a:t>
+            </a:r>
+            <a:endParaRPr/>
+          </a:p>
+          <a:p>
+            <a:pPr>
+              <a:lnSpc>
+                <a:spcPct val="100000"/>
+              </a:lnSpc>
+            </a:pPr>
+            <a:r>
+              <a:rPr lang="en-GB" sz="1000">
+                <a:solidFill>
+                  <a:srgbClr val="000000"/>
+                </a:solidFill>
+                <a:latin typeface="Arial"/>
+              </a:rPr>
+              <a:t>vertices = stc['vertices']</a:t>
+            </a:r>
+            <a:endParaRPr/>
+          </a:p>
+          <a:p>
+            <a:pPr>
+              <a:lnSpc>
+                <a:spcPct val="100000"/>
+              </a:lnSpc>
+            </a:pPr>
+            <a:r>
+              <a:rPr lang="en-GB" sz="1000">
+                <a:solidFill>
+                  <a:srgbClr val="000000"/>
+                </a:solidFill>
+                <a:latin typeface="Arial"/>
+              </a:rPr>
+              <a:t>time = 1e3 * np.linspace(stc['tmin'], stc['tmin'] + data.shape[1] * stc['tstep'], data.shape[1])</a:t>
+            </a:r>
+            <a:endParaRPr/>
+          </a:p>
+          <a:p>
+            <a:pPr>
+              <a:lnSpc>
+                <a:spcPct val="100000"/>
+              </a:lnSpc>
+            </a:pPr>
+            <a:r>
+              <a:rPr lang="en-GB" sz="1000">
+                <a:solidFill>
+                  <a:srgbClr val="000000"/>
+                </a:solidFill>
+                <a:latin typeface="Arial"/>
+              </a:rPr>
+              <a:t>colormap = 'hot'</a:t>
+            </a:r>
+            <a:endParaRPr/>
+          </a:p>
+          <a:p>
+            <a:pPr>
+              <a:lnSpc>
+                <a:spcPct val="100000"/>
+              </a:lnSpc>
+            </a:pPr>
+            <a:r>
+              <a:rPr lang="en-GB" sz="1000">
+                <a:solidFill>
+                  <a:srgbClr val="000000"/>
+                </a:solidFill>
+                <a:latin typeface="Arial"/>
+              </a:rPr>
+              <a:t>time_label = 'time=%0.2f ms'</a:t>
+            </a:r>
+            <a:endParaRPr/>
+          </a:p>
+          <a:p>
+            <a:pPr>
+              <a:lnSpc>
+                <a:spcPct val="100000"/>
+              </a:lnSpc>
+            </a:pPr>
+            <a:r>
+              <a:rPr lang="en-GB" sz="1000">
+                <a:solidFill>
+                  <a:srgbClr val="000000"/>
+                </a:solidFill>
+                <a:latin typeface="Arial"/>
+              </a:rPr>
+              <a:t>brain.add_data(data, colormap=colormap, vertices=vertices, smoothing_steps=10,</a:t>
+            </a:r>
+            <a:endParaRPr/>
+          </a:p>
+          <a:p>
+            <a:pPr>
+              <a:lnSpc>
+                <a:spcPct val="100000"/>
+              </a:lnSpc>
+            </a:pPr>
+            <a:r>
+              <a:rPr lang="en-GB" sz="1000">
+                <a:solidFill>
+                  <a:srgbClr val="000000"/>
+                </a:solidFill>
+                <a:latin typeface="Arial"/>
+              </a:rPr>
+              <a:t>               </a:t>
+            </a:r>
+            <a:r>
+              <a:rPr lang="en-GB" sz="1000">
+                <a:solidFill>
+                  <a:srgbClr val="000000"/>
+                </a:solidFill>
+                <a:latin typeface="Arial"/>
+              </a:rPr>
+              <a:t>time=time, time_label=time_label, hemi='lh')</a:t>
+            </a:r>
+            <a:endParaRPr/>
+          </a:p>
+          <a:p>
+            <a:pPr>
+              <a:lnSpc>
+                <a:spcPct val="100000"/>
+              </a:lnSpc>
+            </a:pPr>
+            <a:r>
+              <a:rPr lang="en-GB" sz="1000">
+                <a:solidFill>
+                  <a:srgbClr val="000000"/>
+                </a:solidFill>
+                <a:latin typeface="Arial"/>
+              </a:rPr>
+              <a:t>stc = read_stc('fsaverage_wbw-meg-rh.stc')</a:t>
+            </a:r>
+            <a:endParaRPr/>
+          </a:p>
+          <a:p>
+            <a:pPr>
+              <a:lnSpc>
+                <a:spcPct val="100000"/>
+              </a:lnSpc>
+            </a:pPr>
+            <a:r>
+              <a:rPr lang="en-GB" sz="1000">
+                <a:solidFill>
+                  <a:srgbClr val="000000"/>
+                </a:solidFill>
+                <a:latin typeface="Arial"/>
+              </a:rPr>
+              <a:t>data = stc['data']</a:t>
+            </a:r>
+            <a:endParaRPr/>
+          </a:p>
+          <a:p>
+            <a:pPr>
+              <a:lnSpc>
+                <a:spcPct val="100000"/>
+              </a:lnSpc>
+            </a:pPr>
+            <a:r>
+              <a:rPr lang="en-GB" sz="1000">
+                <a:solidFill>
+                  <a:srgbClr val="000000"/>
+                </a:solidFill>
+                <a:latin typeface="Arial"/>
+              </a:rPr>
+              <a:t>vertices = stc['vertices']</a:t>
+            </a:r>
+            <a:endParaRPr/>
+          </a:p>
+          <a:p>
+            <a:pPr>
+              <a:lnSpc>
+                <a:spcPct val="100000"/>
+              </a:lnSpc>
+            </a:pPr>
+            <a:r>
+              <a:rPr lang="en-GB" sz="1000">
+                <a:solidFill>
+                  <a:srgbClr val="000000"/>
+                </a:solidFill>
+                <a:latin typeface="Arial"/>
+              </a:rPr>
+              <a:t>brain.add_data(data, colormap=colormap, vertices=vertices, smoothing_steps=10,</a:t>
+            </a:r>
+            <a:endParaRPr/>
+          </a:p>
+          <a:p>
+            <a:pPr>
+              <a:lnSpc>
+                <a:spcPct val="100000"/>
+              </a:lnSpc>
+            </a:pPr>
+            <a:r>
+              <a:rPr lang="en-GB" sz="1000">
+                <a:solidFill>
+                  <a:srgbClr val="000000"/>
+                </a:solidFill>
+                <a:latin typeface="Arial"/>
+              </a:rPr>
+              <a:t>               </a:t>
+            </a:r>
+            <a:r>
+              <a:rPr lang="en-GB" sz="1000">
+                <a:solidFill>
+                  <a:srgbClr val="000000"/>
+                </a:solidFill>
+                <a:latin typeface="Arial"/>
+              </a:rPr>
+              <a:t>time=time, time_label=time_label, hemi='rh')</a:t>
+            </a:r>
+            <a:endParaRPr/>
+          </a:p>
+          <a:p>
+            <a:pPr>
+              <a:lnSpc>
+                <a:spcPct val="100000"/>
+              </a:lnSpc>
+            </a:pPr>
+            <a:r>
+              <a:rPr lang="en-GB" sz="1000">
+                <a:solidFill>
+                  <a:srgbClr val="0000ff"/>
+                </a:solidFill>
+                <a:latin typeface="Arial"/>
+              </a:rPr>
+              <a:t>#brain.set_data_time_index(2)</a:t>
+            </a:r>
+            <a:endParaRPr/>
+          </a:p>
+          <a:p>
+            <a:pPr>
+              <a:lnSpc>
+                <a:spcPct val="100000"/>
+              </a:lnSpc>
+            </a:pPr>
+            <a:r>
+              <a:rPr lang="en-GB" sz="1000">
+                <a:solidFill>
+                  <a:srgbClr val="0000ff"/>
+                </a:solidFill>
+                <a:latin typeface="Arial"/>
+              </a:rPr>
+              <a:t>#brain.scale_data_colormap(fmin=13, fmid=18, fmax=22, transparent=True)</a:t>
+            </a:r>
+            <a:endParaRPr/>
+          </a:p>
+          <a:p>
+            <a:pPr>
+              <a:lnSpc>
+                <a:spcPct val="100000"/>
+              </a:lnSpc>
+            </a:pPr>
+            <a:r>
+              <a:rPr lang="en-GB" sz="1000">
+                <a:solidFill>
+                  <a:srgbClr val="000000"/>
+                </a:solidFill>
+                <a:latin typeface="Arial"/>
+              </a:rPr>
+              <a:t>viewer = TimeViewer(brain)</a:t>
+            </a:r>
+            <a:endParaRPr/>
+          </a:p>
+          <a:p>
+            <a:pPr>
+              <a:lnSpc>
+                <a:spcPct val="100000"/>
+              </a:lnSpc>
+            </a:pPr>
+            <a:endParaRPr/>
+          </a:p>
+        </p:txBody>
+      </p:sp>
     </p:spTree>
   </p:cSld>
   <p:timing>
@@ -6626,7 +7097,7 @@
               <a:rPr b="1" lang="en-GB" sz="4100">
                 <a:latin typeface="Arial"/>
               </a:rPr>
-              <a:t>mne_analyze</a:t>
+              <a:t>MNE pipeline</a:t>
             </a:r>
             <a:endParaRPr/>
           </a:p>
@@ -6640,8 +7111,8 @@
         </p:nvSpPr>
         <p:spPr>
           <a:xfrm>
-            <a:off x="506520" y="1800000"/>
-            <a:ext cx="9068040" cy="4381920"/>
+            <a:off x="502920" y="2165400"/>
+            <a:ext cx="9068400" cy="4673880"/>
           </a:xfrm>
           <a:prstGeom prst="rect">
             <a:avLst/>
@@ -6660,11 +7131,27 @@
               </a:lnSpc>
             </a:pPr>
             <a:r>
-              <a:rPr lang="en-GB" sz="3200">
-                <a:latin typeface="Arial"/>
-              </a:rPr>
-              <a:t>SLORETA, inflated brain, all sorts</a:t>
-            </a:r>
+              <a:rPr lang="en-GB" sz="2200">
+                <a:latin typeface="Arial"/>
+              </a:rPr>
+              <a:t>See activity by the millisecond</a:t>
+            </a:r>
+            <a:endParaRPr/>
+          </a:p>
+          <a:p>
+            <a:pPr>
+              <a:lnSpc>
+                <a:spcPct val="100000"/>
+              </a:lnSpc>
+            </a:pPr>
+            <a:endParaRPr/>
+          </a:p>
+          <a:p>
+            <a:pPr>
+              <a:lnSpc>
+                <a:spcPct val="100000"/>
+              </a:lnSpc>
+            </a:pPr>
             <a:endParaRPr/>
           </a:p>
         </p:txBody>
@@ -6683,8 +7170,8 @@
         </p:blipFill>
         <p:spPr>
           <a:xfrm>
-            <a:off x="-9360" y="2284560"/>
-            <a:ext cx="10077840" cy="4521600"/>
+            <a:off x="2346840" y="2664000"/>
+            <a:ext cx="4421160" cy="4067640"/>
           </a:xfrm>
           <a:prstGeom prst="rect">
             <a:avLst/>
@@ -6784,7 +7271,7 @@
               <a:rPr b="1" lang="en-GB" sz="4100">
                 <a:latin typeface="Arial"/>
               </a:rPr>
-              <a:t>Did I thank Denis?</a:t>
+              <a:t>mne_analyze</a:t>
             </a:r>
             <a:endParaRPr/>
           </a:p>
@@ -6798,8 +7285,8 @@
         </p:nvSpPr>
         <p:spPr>
           <a:xfrm>
-            <a:off x="502920" y="2165040"/>
-            <a:ext cx="9068400" cy="4381920"/>
+            <a:off x="506520" y="1875960"/>
+            <a:ext cx="9068040" cy="1721520"/>
           </a:xfrm>
           <a:prstGeom prst="rect">
             <a:avLst/>
@@ -6818,37 +7305,40 @@
               </a:lnSpc>
             </a:pPr>
             <a:r>
-              <a:rPr lang="en-GB" sz="3200">
-                <a:latin typeface="Arial"/>
-              </a:rPr>
-              <a:t>Not enough</a:t>
-            </a:r>
-            <a:endParaRPr/>
-          </a:p>
-          <a:p>
-            <a:pPr>
-              <a:lnSpc>
-                <a:spcPct val="100000"/>
-              </a:lnSpc>
-            </a:pPr>
-            <a:endParaRPr/>
-          </a:p>
-          <a:p>
-            <a:pPr>
-              <a:lnSpc>
-                <a:spcPct val="100000"/>
-              </a:lnSpc>
-            </a:pPr>
-            <a:r>
-              <a:rPr lang="en-GB" sz="3200">
-                <a:latin typeface="Arial"/>
-              </a:rPr>
-              <a:t>Thank you Denis.</a:t>
-            </a:r>
-            <a:endParaRPr/>
-          </a:p>
-        </p:txBody>
-      </p:sp>
+              <a:rPr lang="en-GB" sz="2600">
+                <a:latin typeface="Arial"/>
+              </a:rPr>
+              <a:t>You can use mne_analyze command line tool. We used it for corregistration, now for visualizing sources</a:t>
+            </a:r>
+            <a:endParaRPr/>
+          </a:p>
+        </p:txBody>
+      </p:sp>
+      <p:pic>
+        <p:nvPicPr>
+          <p:cNvPr id="165" name="" descr=""/>
+          <p:cNvPicPr/>
+          <p:nvPr/>
+        </p:nvPicPr>
+        <p:blipFill>
+          <a:blip r:embed="rId2"/>
+          <a:stretch>
+            <a:fillRect/>
+          </a:stretch>
+        </p:blipFill>
+        <p:spPr>
+          <a:xfrm>
+            <a:off x="26640" y="3059640"/>
+            <a:ext cx="10077840" cy="4546800"/>
+          </a:xfrm>
+          <a:prstGeom prst="rect">
+            <a:avLst/>
+          </a:prstGeom>
+          <a:ln>
+            <a:noFill/>
+          </a:ln>
+        </p:spPr>
+      </p:pic>
     </p:spTree>
   </p:cSld>
   <p:timing>
@@ -6884,6 +7374,16 @@
 <file path=ppt/slides/slide16.xml><?xml version="1.0" encoding="utf-8"?>
 <p:sld xmlns:a="http://schemas.openxmlformats.org/drawingml/2006/main" xmlns:p="http://schemas.openxmlformats.org/presentationml/2006/main" xmlns:r="http://schemas.openxmlformats.org/officeDocument/2006/relationships">
   <p:cSld>
+    <p:bg>
+      <p:bgPr>
+        <a:blipFill>
+          <a:blip r:embed="rId1"/>
+          <a:stretch>
+            <a:fillRect/>
+          </a:stretch>
+        </a:blipFill>
+      </p:bgPr>
+    </p:bg>
     <p:spTree>
       <p:nvGrpSpPr>
         <p:cNvPr id="1" name=""/>
@@ -6900,14 +7400,14 @@
       </p:grpSpPr>
       <p:sp>
         <p:nvSpPr>
-          <p:cNvPr id="165" name="CustomShape 1"/>
+          <p:cNvPr id="166" name="CustomShape 1"/>
           <p:cNvSpPr/>
           <p:nvPr/>
         </p:nvSpPr>
         <p:spPr>
           <a:xfrm>
-            <a:off x="504000" y="301320"/>
-            <a:ext cx="9071640" cy="1261800"/>
+            <a:off x="502920" y="301320"/>
+            <a:ext cx="9068400" cy="1259280"/>
           </a:xfrm>
           <a:prstGeom prst="rect">
             <a:avLst/>
@@ -6917,17 +7417,34 @@
             <a:noFill/>
           </a:ln>
         </p:spPr>
-      </p:sp>
-      <p:sp>
-        <p:nvSpPr>
-          <p:cNvPr id="166" name="CustomShape 2"/>
+        <p:txBody>
+          <a:bodyPr lIns="0" rIns="0" tIns="0" bIns="0" anchor="ctr"/>
+          <a:p>
+            <a:pPr algn="ctr">
+              <a:lnSpc>
+                <a:spcPct val="100000"/>
+              </a:lnSpc>
+            </a:pPr>
+            <a:r>
+              <a:rPr b="1" lang="en-GB" sz="4100">
+                <a:latin typeface="Arial"/>
+              </a:rPr>
+              <a:t>mne_analyze</a:t>
+            </a:r>
+            <a:endParaRPr/>
+          </a:p>
+        </p:txBody>
+      </p:sp>
+      <p:sp>
+        <p:nvSpPr>
+          <p:cNvPr id="167" name="CustomShape 2"/>
           <p:cNvSpPr/>
           <p:nvPr/>
         </p:nvSpPr>
         <p:spPr>
           <a:xfrm>
-            <a:off x="504000" y="1768680"/>
-            <a:ext cx="9071640" cy="4383720"/>
+            <a:off x="506520" y="1800000"/>
+            <a:ext cx="9068040" cy="4381920"/>
           </a:xfrm>
           <a:prstGeom prst="rect">
             <a:avLst/>
@@ -6937,55 +7454,27 @@
             <a:noFill/>
           </a:ln>
         </p:spPr>
-      </p:sp>
-      <p:sp>
-        <p:nvSpPr>
-          <p:cNvPr id="167" name="CustomShape 3"/>
-          <p:cNvSpPr/>
-          <p:nvPr/>
-        </p:nvSpPr>
-        <p:spPr>
-          <a:xfrm>
-            <a:off x="504000" y="1768680"/>
-            <a:ext cx="9071640" cy="4383720"/>
-          </a:xfrm>
-          <a:prstGeom prst="rect">
-            <a:avLst/>
-          </a:prstGeom>
-          <a:noFill/>
-          <a:ln>
-            <a:noFill/>
-          </a:ln>
-        </p:spPr>
+        <p:txBody>
+          <a:bodyPr lIns="0" rIns="0" tIns="28080" bIns="0"/>
+          <a:p>
+            <a:pPr>
+              <a:lnSpc>
+                <a:spcPct val="100000"/>
+              </a:lnSpc>
+            </a:pPr>
+            <a:r>
+              <a:rPr lang="en-GB" sz="3200">
+                <a:latin typeface="Arial"/>
+              </a:rPr>
+              <a:t>SLORETA, inflated brain, all sorts</a:t>
+            </a:r>
+            <a:endParaRPr/>
+          </a:p>
+        </p:txBody>
       </p:sp>
       <p:pic>
         <p:nvPicPr>
           <p:cNvPr id="168" name="" descr=""/>
-          <p:cNvPicPr/>
-          <p:nvPr/>
-        </p:nvPicPr>
-        <p:blipFill>
-          <a:blip r:embed="rId1"/>
-          <a:stretch>
-            <a:fillRect/>
-          </a:stretch>
-        </p:blipFill>
-        <p:spPr>
-          <a:xfrm>
-            <a:off x="2292480" y="1768680"/>
-            <a:ext cx="5494320" cy="4383720"/>
-          </a:xfrm>
-          <a:prstGeom prst="rect">
-            <a:avLst/>
-          </a:prstGeom>
-          <a:ln>
-            <a:noFill/>
-          </a:ln>
-        </p:spPr>
-      </p:pic>
-      <p:pic>
-        <p:nvPicPr>
-          <p:cNvPr id="169" name="" descr=""/>
           <p:cNvPicPr/>
           <p:nvPr/>
         </p:nvPicPr>
@@ -6997,8 +7486,8 @@
         </p:blipFill>
         <p:spPr>
           <a:xfrm>
-            <a:off x="2292480" y="1768680"/>
-            <a:ext cx="5494320" cy="4383720"/>
+            <a:off x="-9360" y="2284560"/>
+            <a:ext cx="10077840" cy="4521600"/>
           </a:xfrm>
           <a:prstGeom prst="rect">
             <a:avLst/>
@@ -7010,6 +7499,188 @@
       </p:pic>
     </p:spTree>
   </p:cSld>
+  <p:timing>
+    <p:tnLst>
+      <p:par>
+        <p:cTn id="31" dur="indefinite" restart="never" nodeType="tmRoot">
+          <p:childTnLst>
+            <p:seq>
+              <p:cTn id="32" dur="indefinite" nodeType="mainSeq"/>
+              <p:prevCondLst>
+                <p:cond delay="0" evt="onPrev">
+                  <p:tgtEl>
+                    <p:sldTgt/>
+                  </p:tgtEl>
+                </p:cond>
+              </p:prevCondLst>
+              <p:nextCondLst>
+                <p:cond delay="0" evt="onNext">
+                  <p:tgtEl>
+                    <p:sldTgt/>
+                  </p:tgtEl>
+                </p:cond>
+              </p:nextCondLst>
+            </p:seq>
+          </p:childTnLst>
+        </p:cTn>
+      </p:par>
+    </p:tnLst>
+  </p:timing>
+</p:sld>
+</file>
+
+<file path=ppt/slides/slide17.xml><?xml version="1.0" encoding="utf-8"?>
+<p:sld xmlns:a="http://schemas.openxmlformats.org/drawingml/2006/main" xmlns:p="http://schemas.openxmlformats.org/presentationml/2006/main" xmlns:r="http://schemas.openxmlformats.org/officeDocument/2006/relationships">
+  <p:cSld>
+    <p:bg>
+      <p:bgPr>
+        <a:blipFill>
+          <a:blip r:embed="rId1"/>
+          <a:stretch>
+            <a:fillRect/>
+          </a:stretch>
+        </a:blipFill>
+      </p:bgPr>
+    </p:bg>
+    <p:spTree>
+      <p:nvGrpSpPr>
+        <p:cNvPr id="1" name=""/>
+        <p:cNvGrpSpPr/>
+        <p:nvPr/>
+      </p:nvGrpSpPr>
+      <p:grpSpPr>
+        <a:xfrm>
+          <a:off x="0" y="0"/>
+          <a:ext cx="0" cy="0"/>
+          <a:chOff x="0" y="0"/>
+          <a:chExt cx="0" cy="0"/>
+        </a:xfrm>
+      </p:grpSpPr>
+      <p:sp>
+        <p:nvSpPr>
+          <p:cNvPr id="169" name="CustomShape 1"/>
+          <p:cNvSpPr/>
+          <p:nvPr/>
+        </p:nvSpPr>
+        <p:spPr>
+          <a:xfrm>
+            <a:off x="502920" y="301320"/>
+            <a:ext cx="9068400" cy="1259280"/>
+          </a:xfrm>
+          <a:prstGeom prst="rect">
+            <a:avLst/>
+          </a:prstGeom>
+          <a:noFill/>
+          <a:ln>
+            <a:noFill/>
+          </a:ln>
+        </p:spPr>
+        <p:txBody>
+          <a:bodyPr lIns="0" rIns="0" tIns="0" bIns="0" anchor="ctr"/>
+          <a:p>
+            <a:pPr algn="ctr">
+              <a:lnSpc>
+                <a:spcPct val="100000"/>
+              </a:lnSpc>
+            </a:pPr>
+            <a:r>
+              <a:rPr b="1" lang="en-GB" sz="4100">
+                <a:latin typeface="Arial"/>
+              </a:rPr>
+              <a:t>Did I thank Denis?</a:t>
+            </a:r>
+            <a:endParaRPr/>
+          </a:p>
+        </p:txBody>
+      </p:sp>
+      <p:sp>
+        <p:nvSpPr>
+          <p:cNvPr id="170" name="CustomShape 2"/>
+          <p:cNvSpPr/>
+          <p:nvPr/>
+        </p:nvSpPr>
+        <p:spPr>
+          <a:xfrm>
+            <a:off x="502920" y="2165040"/>
+            <a:ext cx="9068400" cy="4381920"/>
+          </a:xfrm>
+          <a:prstGeom prst="rect">
+            <a:avLst/>
+          </a:prstGeom>
+          <a:noFill/>
+          <a:ln>
+            <a:noFill/>
+          </a:ln>
+        </p:spPr>
+        <p:txBody>
+          <a:bodyPr lIns="0" rIns="0" tIns="28080" bIns="0"/>
+          <a:p>
+            <a:pPr>
+              <a:lnSpc>
+                <a:spcPct val="100000"/>
+              </a:lnSpc>
+            </a:pPr>
+            <a:r>
+              <a:rPr lang="en-GB" sz="3200">
+                <a:latin typeface="Arial"/>
+              </a:rPr>
+              <a:t>Not enough</a:t>
+            </a:r>
+            <a:endParaRPr/>
+          </a:p>
+          <a:p>
+            <a:pPr>
+              <a:lnSpc>
+                <a:spcPct val="100000"/>
+              </a:lnSpc>
+            </a:pPr>
+            <a:endParaRPr/>
+          </a:p>
+          <a:p>
+            <a:pPr>
+              <a:lnSpc>
+                <a:spcPct val="100000"/>
+              </a:lnSpc>
+            </a:pPr>
+            <a:r>
+              <a:rPr lang="en-GB" sz="3200">
+                <a:latin typeface="Arial"/>
+              </a:rPr>
+              <a:t>Thank you Denis.</a:t>
+            </a:r>
+            <a:endParaRPr/>
+          </a:p>
+        </p:txBody>
+      </p:sp>
+    </p:spTree>
+  </p:cSld>
+  <p:timing>
+    <p:tnLst>
+      <p:par>
+        <p:cTn id="33" dur="indefinite" restart="never" nodeType="tmRoot">
+          <p:childTnLst>
+            <p:seq>
+              <p:cTn id="34" dur="indefinite" nodeType="mainSeq"/>
+              <p:prevCondLst>
+                <p:cond delay="0" evt="onPrev">
+                  <p:tgtEl>
+                    <p:sldTgt/>
+                  </p:tgtEl>
+                </p:cond>
+              </p:prevCondLst>
+              <p:nextCondLst>
+                <p:cond delay="0" evt="onNext">
+                  <p:tgtEl>
+                    <p:sldTgt/>
+                  </p:tgtEl>
+                </p:cond>
+              </p:nextCondLst>
+            </p:seq>
+          </p:childTnLst>
+        </p:cTn>
+      </p:par>
+    </p:tnLst>
+  </p:timing>
 </p:sld>
 </file>
 

</xml_diff>